<commit_message>
Update Capstone 2  Music Recommendation App.pptx
v2
</commit_message>
<xml_diff>
--- a/business-model/Capstone 2  Music Recommendation App.pptx
+++ b/business-model/Capstone 2  Music Recommendation App.pptx
@@ -4365,6 +4365,49 @@
       </p:grpSpPr>
       <p:sp>
         <p:nvSpPr>
+          <p:cNvPr id="13" name="Title 1">
+            <a:extLst>
+              <a:ext uri="{FF2B5EF4-FFF2-40B4-BE49-F238E27FC236}">
+                <a16:creationId xmlns:a16="http://schemas.microsoft.com/office/drawing/2014/main" id="{61C4A4DA-0FD0-4295-A9B4-4F67C5845F57}"/>
+              </a:ext>
+            </a:extLst>
+          </p:cNvPr>
+          <p:cNvSpPr>
+            <a:spLocks noGrp="1"/>
+          </p:cNvSpPr>
+          <p:nvPr>
+            <p:ph type="title"/>
+          </p:nvPr>
+        </p:nvSpPr>
+        <p:spPr>
+          <a:xfrm>
+            <a:off x="1066800" y="1005840"/>
+            <a:ext cx="10058400" cy="1243373"/>
+          </a:xfrm>
+        </p:spPr>
+        <p:txBody>
+          <a:bodyPr>
+            <a:normAutofit/>
+          </a:bodyPr>
+          <a:lstStyle/>
+          <a:p>
+            <a:r>
+              <a:rPr lang="en-US" sz="2800" b="1" dirty="0">
+                <a:effectLst/>
+              </a:rPr>
+              <a:t>Solution Design </a:t>
+            </a:r>
+            <a:br>
+              <a:rPr lang="en-US" sz="4000" b="1" dirty="0">
+                <a:effectLst/>
+              </a:rPr>
+            </a:br>
+            <a:endParaRPr lang="en-US" dirty="0"/>
+          </a:p>
+        </p:txBody>
+      </p:sp>
+      <p:sp>
+        <p:nvSpPr>
           <p:cNvPr id="3" name="TextBox 2">
             <a:extLst>
               <a:ext uri="{FF2B5EF4-FFF2-40B4-BE49-F238E27FC236}">
@@ -4377,229 +4420,275 @@
         </p:nvSpPr>
         <p:spPr>
           <a:xfrm>
-            <a:off x="357351" y="451945"/>
-            <a:ext cx="8881241" cy="3354765"/>
+            <a:off x="1066800" y="1744717"/>
+            <a:ext cx="4663440" cy="4107443"/>
+          </a:xfrm>
+          <a:prstGeom prst="rect">
+            <a:avLst/>
+          </a:prstGeom>
+        </p:spPr>
+        <p:txBody>
+          <a:bodyPr vert="horz" lIns="91440" tIns="45720" rIns="91440" bIns="45720" rtlCol="0">
+            <a:normAutofit/>
+          </a:bodyPr>
+          <a:lstStyle/>
+          <a:p>
+            <a:pPr marL="0" marR="0" indent="-182880">
+              <a:lnSpc>
+                <a:spcPct val="90000"/>
+              </a:lnSpc>
+              <a:spcAft>
+                <a:spcPts val="600"/>
+              </a:spcAft>
+              <a:buClr>
+                <a:schemeClr val="tx1">
+                  <a:lumMod val="85000"/>
+                  <a:lumOff val="15000"/>
+                </a:schemeClr>
+              </a:buClr>
+              <a:buFont typeface="Garamond" pitchFamily="18" charset="0"/>
+              <a:buChar char="◦"/>
+            </a:pPr>
+            <a:endParaRPr lang="en-US" sz="1500" b="1" dirty="0">
+              <a:effectLst/>
+            </a:endParaRPr>
+          </a:p>
+          <a:p>
+            <a:pPr marL="342900" marR="0" lvl="0" indent="-182880">
+              <a:lnSpc>
+                <a:spcPct val="90000"/>
+              </a:lnSpc>
+              <a:spcBef>
+                <a:spcPts val="0"/>
+              </a:spcBef>
+              <a:spcAft>
+                <a:spcPts val="600"/>
+              </a:spcAft>
+              <a:buClr>
+                <a:schemeClr val="tx1">
+                  <a:lumMod val="85000"/>
+                  <a:lumOff val="15000"/>
+                </a:schemeClr>
+              </a:buClr>
+              <a:buFont typeface="Garamond" pitchFamily="18" charset="0"/>
+              <a:buChar char="◦"/>
+            </a:pPr>
+            <a:r>
+              <a:rPr lang="en-US" sz="1500" dirty="0">
+                <a:effectLst/>
+              </a:rPr>
+              <a:t>Music App: UI consist of User profile, User Preference, User Playlist . These details persist in NoSQL DB.</a:t>
+            </a:r>
+          </a:p>
+          <a:p>
+            <a:pPr marR="0" lvl="0" indent="-182880">
+              <a:lnSpc>
+                <a:spcPct val="90000"/>
+              </a:lnSpc>
+              <a:spcBef>
+                <a:spcPts val="0"/>
+              </a:spcBef>
+              <a:spcAft>
+                <a:spcPts val="600"/>
+              </a:spcAft>
+              <a:buClr>
+                <a:schemeClr val="tx1">
+                  <a:lumMod val="85000"/>
+                  <a:lumOff val="15000"/>
+                </a:schemeClr>
+              </a:buClr>
+              <a:buFont typeface="Garamond" pitchFamily="18" charset="0"/>
+              <a:buChar char="◦"/>
+            </a:pPr>
+            <a:endParaRPr lang="en-US" sz="1500" dirty="0">
+              <a:effectLst/>
+            </a:endParaRPr>
+          </a:p>
+          <a:p>
+            <a:pPr marL="342900" marR="0" lvl="0" indent="-182880">
+              <a:lnSpc>
+                <a:spcPct val="90000"/>
+              </a:lnSpc>
+              <a:spcBef>
+                <a:spcPts val="0"/>
+              </a:spcBef>
+              <a:spcAft>
+                <a:spcPts val="600"/>
+              </a:spcAft>
+              <a:buClr>
+                <a:schemeClr val="tx1">
+                  <a:lumMod val="85000"/>
+                  <a:lumOff val="15000"/>
+                </a:schemeClr>
+              </a:buClr>
+              <a:buFont typeface="Garamond" pitchFamily="18" charset="0"/>
+              <a:buChar char="◦"/>
+            </a:pPr>
+            <a:r>
+              <a:rPr lang="en-US" sz="1500" dirty="0">
+                <a:effectLst/>
+              </a:rPr>
+              <a:t>Music ML: Trained Machine Learning model deploys on Azure ML.</a:t>
+            </a:r>
+          </a:p>
+          <a:p>
+            <a:pPr marR="0" lvl="0" indent="-182880">
+              <a:lnSpc>
+                <a:spcPct val="90000"/>
+              </a:lnSpc>
+              <a:spcBef>
+                <a:spcPts val="0"/>
+              </a:spcBef>
+              <a:spcAft>
+                <a:spcPts val="600"/>
+              </a:spcAft>
+              <a:buClr>
+                <a:schemeClr val="tx1">
+                  <a:lumMod val="85000"/>
+                  <a:lumOff val="15000"/>
+                </a:schemeClr>
+              </a:buClr>
+              <a:buFont typeface="Garamond" pitchFamily="18" charset="0"/>
+              <a:buChar char="◦"/>
+            </a:pPr>
+            <a:endParaRPr lang="en-US" sz="1500" dirty="0">
+              <a:effectLst/>
+            </a:endParaRPr>
+          </a:p>
+          <a:p>
+            <a:pPr marL="342900" marR="0" lvl="0" indent="-182880">
+              <a:lnSpc>
+                <a:spcPct val="90000"/>
+              </a:lnSpc>
+              <a:spcBef>
+                <a:spcPts val="0"/>
+              </a:spcBef>
+              <a:spcAft>
+                <a:spcPts val="600"/>
+              </a:spcAft>
+              <a:buClr>
+                <a:schemeClr val="tx1">
+                  <a:lumMod val="85000"/>
+                  <a:lumOff val="15000"/>
+                </a:schemeClr>
+              </a:buClr>
+              <a:buFont typeface="Garamond" pitchFamily="18" charset="0"/>
+              <a:buChar char="◦"/>
+            </a:pPr>
+            <a:r>
+              <a:rPr lang="en-US" sz="1500" dirty="0">
+                <a:effectLst/>
+              </a:rPr>
+              <a:t>Music App calls rest service exposed from Music ML model for music recommendation.</a:t>
+            </a:r>
+          </a:p>
+          <a:p>
+            <a:pPr marL="342900" marR="0" lvl="0" indent="-182880">
+              <a:lnSpc>
+                <a:spcPct val="90000"/>
+              </a:lnSpc>
+              <a:spcBef>
+                <a:spcPts val="0"/>
+              </a:spcBef>
+              <a:spcAft>
+                <a:spcPts val="600"/>
+              </a:spcAft>
+              <a:buClr>
+                <a:schemeClr val="tx1">
+                  <a:lumMod val="85000"/>
+                  <a:lumOff val="15000"/>
+                </a:schemeClr>
+              </a:buClr>
+              <a:buFont typeface="Garamond" pitchFamily="18" charset="0"/>
+              <a:buChar char="◦"/>
+            </a:pPr>
+            <a:endParaRPr lang="en-US" sz="1500" dirty="0"/>
+          </a:p>
+          <a:p>
+            <a:pPr marL="342900" marR="0" lvl="0" indent="-182880">
+              <a:lnSpc>
+                <a:spcPct val="90000"/>
+              </a:lnSpc>
+              <a:spcBef>
+                <a:spcPts val="0"/>
+              </a:spcBef>
+              <a:spcAft>
+                <a:spcPts val="600"/>
+              </a:spcAft>
+              <a:buClr>
+                <a:schemeClr val="tx1">
+                  <a:lumMod val="85000"/>
+                  <a:lumOff val="15000"/>
+                </a:schemeClr>
+              </a:buClr>
+              <a:buFont typeface="Garamond" pitchFamily="18" charset="0"/>
+              <a:buChar char="◦"/>
+            </a:pPr>
+            <a:r>
+              <a:rPr lang="en-US" sz="1500" dirty="0"/>
+              <a:t>Reference Architecture for building solution on Azure Cloud shown in fig.</a:t>
+            </a:r>
+            <a:endParaRPr lang="en-US" sz="1500" dirty="0">
+              <a:effectLst/>
+            </a:endParaRPr>
+          </a:p>
+          <a:p>
+            <a:pPr marR="0" lvl="0" indent="-182880">
+              <a:lnSpc>
+                <a:spcPct val="90000"/>
+              </a:lnSpc>
+              <a:spcBef>
+                <a:spcPts val="0"/>
+              </a:spcBef>
+              <a:spcAft>
+                <a:spcPts val="600"/>
+              </a:spcAft>
+              <a:buClr>
+                <a:schemeClr val="tx1">
+                  <a:lumMod val="85000"/>
+                  <a:lumOff val="15000"/>
+                </a:schemeClr>
+              </a:buClr>
+              <a:buFont typeface="Garamond" pitchFamily="18" charset="0"/>
+              <a:buChar char="◦"/>
+            </a:pPr>
+            <a:endParaRPr lang="en-US" sz="1500" dirty="0">
+              <a:effectLst/>
+            </a:endParaRPr>
+          </a:p>
+        </p:txBody>
+      </p:sp>
+      <p:pic>
+        <p:nvPicPr>
+          <p:cNvPr id="8" name="Picture 7" descr="Diagram&#10;&#10;Description automatically generated">
+            <a:extLst>
+              <a:ext uri="{FF2B5EF4-FFF2-40B4-BE49-F238E27FC236}">
+                <a16:creationId xmlns:a16="http://schemas.microsoft.com/office/drawing/2014/main" id="{56100C4C-8453-4FD8-A371-BB2767671DDC}"/>
+              </a:ext>
+            </a:extLst>
+          </p:cNvPr>
+          <p:cNvPicPr>
+            <a:picLocks noChangeAspect="1"/>
+          </p:cNvPicPr>
+          <p:nvPr/>
+        </p:nvPicPr>
+        <p:blipFill>
+          <a:blip r:embed="rId2"/>
+          <a:stretch>
+            <a:fillRect/>
+          </a:stretch>
+        </p:blipFill>
+        <p:spPr>
+          <a:xfrm>
+            <a:off x="6461762" y="1849821"/>
+            <a:ext cx="4663440" cy="3397622"/>
           </a:xfrm>
           <a:prstGeom prst="rect">
             <a:avLst/>
           </a:prstGeom>
           <a:noFill/>
         </p:spPr>
-        <p:txBody>
-          <a:bodyPr wrap="square">
-            <a:spAutoFit/>
-          </a:bodyPr>
-          <a:lstStyle/>
-          <a:p>
-            <a:pPr marL="0" marR="0"/>
-            <a:r>
-              <a:rPr lang="en-US" sz="1800" b="1" dirty="0">
-                <a:effectLst/>
-                <a:latin typeface="Times New Roman" panose="02020603050405020304" pitchFamily="18" charset="0"/>
-                <a:ea typeface="Times New Roman" panose="02020603050405020304" pitchFamily="18" charset="0"/>
-              </a:rPr>
-              <a:t>Solution Design </a:t>
-            </a:r>
-          </a:p>
-          <a:p>
-            <a:pPr marL="0" marR="0"/>
-            <a:endParaRPr lang="en-US" sz="1800" b="1" dirty="0">
-              <a:effectLst/>
-              <a:latin typeface="Times New Roman" panose="02020603050405020304" pitchFamily="18" charset="0"/>
-              <a:ea typeface="Times New Roman" panose="02020603050405020304" pitchFamily="18" charset="0"/>
-            </a:endParaRPr>
-          </a:p>
-          <a:p>
-            <a:pPr marL="342900" marR="0" lvl="0" indent="-342900" algn="just">
-              <a:spcBef>
-                <a:spcPts val="0"/>
-              </a:spcBef>
-              <a:spcAft>
-                <a:spcPts val="0"/>
-              </a:spcAft>
-              <a:buFont typeface="Symbol" panose="05050102010706020507" pitchFamily="18" charset="2"/>
-              <a:buChar char=""/>
-            </a:pPr>
-            <a:r>
-              <a:rPr lang="en-US" sz="1800" dirty="0">
-                <a:effectLst/>
-                <a:latin typeface="Calibri" panose="020F0502020204030204" pitchFamily="34" charset="0"/>
-                <a:ea typeface="Calibri" panose="020F0502020204030204" pitchFamily="34" charset="0"/>
-                <a:cs typeface="Calibri" panose="020F0502020204030204" pitchFamily="34" charset="0"/>
-              </a:rPr>
-              <a:t>Music App: UI consist of User profile, User Preference, User Playlist . These details persist in NoSQL DB.</a:t>
-            </a:r>
-          </a:p>
-          <a:p>
-            <a:pPr marR="0" lvl="0" algn="just">
-              <a:spcBef>
-                <a:spcPts val="0"/>
-              </a:spcBef>
-              <a:spcAft>
-                <a:spcPts val="0"/>
-              </a:spcAft>
-            </a:pPr>
-            <a:endParaRPr lang="en-US" sz="1400" dirty="0">
-              <a:effectLst/>
-              <a:latin typeface="Calibri" panose="020F0502020204030204" pitchFamily="34" charset="0"/>
-              <a:ea typeface="Calibri" panose="020F0502020204030204" pitchFamily="34" charset="0"/>
-              <a:cs typeface="Arial" panose="020B0604020202020204" pitchFamily="34" charset="0"/>
-            </a:endParaRPr>
-          </a:p>
-          <a:p>
-            <a:pPr marL="342900" marR="0" lvl="0" indent="-342900" algn="just">
-              <a:spcBef>
-                <a:spcPts val="0"/>
-              </a:spcBef>
-              <a:spcAft>
-                <a:spcPts val="0"/>
-              </a:spcAft>
-              <a:buFont typeface="Symbol" panose="05050102010706020507" pitchFamily="18" charset="2"/>
-              <a:buChar char=""/>
-            </a:pPr>
-            <a:r>
-              <a:rPr lang="en-US" sz="1800" dirty="0">
-                <a:effectLst/>
-                <a:latin typeface="Calibri" panose="020F0502020204030204" pitchFamily="34" charset="0"/>
-                <a:ea typeface="Calibri" panose="020F0502020204030204" pitchFamily="34" charset="0"/>
-                <a:cs typeface="Calibri" panose="020F0502020204030204" pitchFamily="34" charset="0"/>
-              </a:rPr>
-              <a:t>Music ML: Trained Machine Learning model deploys on Azure ML.</a:t>
-            </a:r>
-          </a:p>
-          <a:p>
-            <a:pPr marR="0" lvl="0" algn="just">
-              <a:spcBef>
-                <a:spcPts val="0"/>
-              </a:spcBef>
-              <a:spcAft>
-                <a:spcPts val="0"/>
-              </a:spcAft>
-            </a:pPr>
-            <a:endParaRPr lang="en-US" sz="1400" dirty="0">
-              <a:effectLst/>
-              <a:latin typeface="Calibri" panose="020F0502020204030204" pitchFamily="34" charset="0"/>
-              <a:ea typeface="Calibri" panose="020F0502020204030204" pitchFamily="34" charset="0"/>
-              <a:cs typeface="Arial" panose="020B0604020202020204" pitchFamily="34" charset="0"/>
-            </a:endParaRPr>
-          </a:p>
-          <a:p>
-            <a:pPr marL="342900" marR="0" lvl="0" indent="-342900" algn="just">
-              <a:spcBef>
-                <a:spcPts val="0"/>
-              </a:spcBef>
-              <a:spcAft>
-                <a:spcPts val="0"/>
-              </a:spcAft>
-              <a:buFont typeface="Symbol" panose="05050102010706020507" pitchFamily="18" charset="2"/>
-              <a:buChar char=""/>
-            </a:pPr>
-            <a:r>
-              <a:rPr lang="en-US" sz="1800" dirty="0">
-                <a:effectLst/>
-                <a:latin typeface="Calibri" panose="020F0502020204030204" pitchFamily="34" charset="0"/>
-                <a:ea typeface="Calibri" panose="020F0502020204030204" pitchFamily="34" charset="0"/>
-                <a:cs typeface="Calibri" panose="020F0502020204030204" pitchFamily="34" charset="0"/>
-              </a:rPr>
-              <a:t>Music App calls rest service exposed from Music ML model for music recommendation.</a:t>
-            </a:r>
-          </a:p>
-          <a:p>
-            <a:pPr marL="342900" marR="0" lvl="0" indent="-342900" algn="just">
-              <a:spcBef>
-                <a:spcPts val="0"/>
-              </a:spcBef>
-              <a:spcAft>
-                <a:spcPts val="0"/>
-              </a:spcAft>
-              <a:buFont typeface="Symbol" panose="05050102010706020507" pitchFamily="18" charset="2"/>
-              <a:buChar char=""/>
-            </a:pPr>
-            <a:endParaRPr lang="en-US" dirty="0">
-              <a:latin typeface="Calibri" panose="020F0502020204030204" pitchFamily="34" charset="0"/>
-              <a:ea typeface="Calibri" panose="020F0502020204030204" pitchFamily="34" charset="0"/>
-              <a:cs typeface="Calibri" panose="020F0502020204030204" pitchFamily="34" charset="0"/>
-            </a:endParaRPr>
-          </a:p>
-          <a:p>
-            <a:pPr marL="342900" marR="0" lvl="0" indent="-342900" algn="just">
-              <a:spcBef>
-                <a:spcPts val="0"/>
-              </a:spcBef>
-              <a:spcAft>
-                <a:spcPts val="0"/>
-              </a:spcAft>
-              <a:buFont typeface="Symbol" panose="05050102010706020507" pitchFamily="18" charset="2"/>
-              <a:buChar char=""/>
-            </a:pPr>
-            <a:endParaRPr lang="en-US" sz="1400" dirty="0">
-              <a:effectLst/>
-              <a:latin typeface="Calibri" panose="020F0502020204030204" pitchFamily="34" charset="0"/>
-              <a:ea typeface="Calibri" panose="020F0502020204030204" pitchFamily="34" charset="0"/>
-              <a:cs typeface="Calibri" panose="020F0502020204030204" pitchFamily="34" charset="0"/>
-            </a:endParaRPr>
-          </a:p>
-          <a:p>
-            <a:pPr marL="342900" marR="0" lvl="0" indent="-342900" algn="just">
-              <a:spcBef>
-                <a:spcPts val="0"/>
-              </a:spcBef>
-              <a:spcAft>
-                <a:spcPts val="0"/>
-              </a:spcAft>
-              <a:buFont typeface="Symbol" panose="05050102010706020507" pitchFamily="18" charset="2"/>
-              <a:buChar char=""/>
-            </a:pPr>
-            <a:endParaRPr lang="en-US" sz="1400" dirty="0">
-              <a:latin typeface="Calibri" panose="020F0502020204030204" pitchFamily="34" charset="0"/>
-              <a:ea typeface="Calibri" panose="020F0502020204030204" pitchFamily="34" charset="0"/>
-              <a:cs typeface="Calibri" panose="020F0502020204030204" pitchFamily="34" charset="0"/>
-            </a:endParaRPr>
-          </a:p>
-          <a:p>
-            <a:pPr marL="342900" marR="0" lvl="0" indent="-342900" algn="just">
-              <a:spcBef>
-                <a:spcPts val="0"/>
-              </a:spcBef>
-              <a:spcAft>
-                <a:spcPts val="0"/>
-              </a:spcAft>
-              <a:buFont typeface="Symbol" panose="05050102010706020507" pitchFamily="18" charset="2"/>
-              <a:buChar char=""/>
-            </a:pPr>
-            <a:endParaRPr lang="en-US" sz="1400" dirty="0">
-              <a:effectLst/>
-              <a:latin typeface="Calibri" panose="020F0502020204030204" pitchFamily="34" charset="0"/>
-              <a:ea typeface="Calibri" panose="020F0502020204030204" pitchFamily="34" charset="0"/>
-              <a:cs typeface="Calibri" panose="020F0502020204030204" pitchFamily="34" charset="0"/>
-            </a:endParaRPr>
-          </a:p>
-          <a:p>
-            <a:pPr marR="0" lvl="0" algn="just">
-              <a:spcBef>
-                <a:spcPts val="0"/>
-              </a:spcBef>
-              <a:spcAft>
-                <a:spcPts val="0"/>
-              </a:spcAft>
-            </a:pPr>
-            <a:r>
-              <a:rPr lang="en-US" sz="1600" b="1" dirty="0">
-                <a:latin typeface="Calibri" panose="020F0502020204030204" pitchFamily="34" charset="0"/>
-                <a:ea typeface="Calibri" panose="020F0502020204030204" pitchFamily="34" charset="0"/>
-                <a:cs typeface="Calibri" panose="020F0502020204030204" pitchFamily="34" charset="0"/>
-              </a:rPr>
-              <a:t>Continues &gt; &gt; &gt; &gt; &gt; &gt;&gt;&gt;&gt;&gt;</a:t>
-            </a:r>
-            <a:endParaRPr lang="en-US" sz="1600" b="1" dirty="0">
-              <a:effectLst/>
-              <a:latin typeface="Calibri" panose="020F0502020204030204" pitchFamily="34" charset="0"/>
-              <a:ea typeface="Calibri" panose="020F0502020204030204" pitchFamily="34" charset="0"/>
-              <a:cs typeface="Arial" panose="020B0604020202020204" pitchFamily="34" charset="0"/>
-            </a:endParaRPr>
-          </a:p>
-        </p:txBody>
-      </p:sp>
+      </p:pic>
     </p:spTree>
     <p:extLst>
       <p:ext uri="{BB962C8B-B14F-4D97-AF65-F5344CB8AC3E}">
@@ -8751,6 +8840,24 @@
 </file>
 
 <file path=customXml/item1.xml><?xml version="1.0" encoding="utf-8"?>
+<p:properties xmlns:p="http://schemas.microsoft.com/office/2006/metadata/properties" xmlns:xsi="http://www.w3.org/2001/XMLSchema-instance" xmlns:pc="http://schemas.microsoft.com/office/infopath/2007/PartnerControls">
+  <documentManagement>
+    <Status xmlns="71af3243-3dd4-4a8d-8c0d-dd76da1f02a5">Not started</Status>
+    <MediaServiceKeyPoints xmlns="71af3243-3dd4-4a8d-8c0d-dd76da1f02a5" xsi:nil="true"/>
+  </documentManagement>
+</p:properties>
+</file>
+
+<file path=customXml/item2.xml><?xml version="1.0" encoding="utf-8"?>
+<?mso-contentType ?>
+<FormTemplates xmlns="http://schemas.microsoft.com/sharepoint/v3/contenttype/forms">
+  <Display>DocumentLibraryForm</Display>
+  <Edit>DocumentLibraryForm</Edit>
+  <New>DocumentLibraryForm</New>
+</FormTemplates>
+</file>
+
+<file path=customXml/item3.xml><?xml version="1.0" encoding="utf-8"?>
 <ct:contentTypeSchema xmlns:ct="http://schemas.microsoft.com/office/2006/metadata/contentType" xmlns:ma="http://schemas.microsoft.com/office/2006/metadata/properties/metaAttributes" ct:_="" ma:_="" ma:contentTypeName="Document" ma:contentTypeID="0x01010079F111ED35F8CC479449609E8A0923A6" ma:contentTypeVersion="12" ma:contentTypeDescription="Create a new document." ma:contentTypeScope="" ma:versionID="a410dd7f93c95333ffa1b60ed6adedd1">
   <xsd:schema xmlns:xsd="http://www.w3.org/2001/XMLSchema" xmlns:xs="http://www.w3.org/2001/XMLSchema" xmlns:p="http://schemas.microsoft.com/office/2006/metadata/properties" xmlns:ns2="71af3243-3dd4-4a8d-8c0d-dd76da1f02a5" xmlns:ns3="16c05727-aa75-4e4a-9b5f-8a80a1165891" targetNamespace="http://schemas.microsoft.com/office/2006/metadata/properties" ma:root="true" ma:fieldsID="a936d9baba76aa3866493feff160faab" ns2:_="" ns3:_="">
     <xsd:import namespace="71af3243-3dd4-4a8d-8c0d-dd76da1f02a5"/>
@@ -8971,25 +9078,25 @@
 </ct:contentTypeSchema>
 </file>
 
-<file path=customXml/item2.xml><?xml version="1.0" encoding="utf-8"?>
-<?mso-contentType ?>
-<FormTemplates xmlns="http://schemas.microsoft.com/sharepoint/v3/contenttype/forms">
-  <Display>DocumentLibraryForm</Display>
-  <Edit>DocumentLibraryForm</Edit>
-  <New>DocumentLibraryForm</New>
-</FormTemplates>
+<file path=customXml/itemProps1.xml><?xml version="1.0" encoding="utf-8"?>
+<ds:datastoreItem xmlns:ds="http://schemas.openxmlformats.org/officeDocument/2006/customXml" ds:itemID="{137651BA-F45C-4845-9AB3-E0A65B39F5E1}">
+  <ds:schemaRefs>
+    <ds:schemaRef ds:uri="http://schemas.microsoft.com/office/2006/metadata/properties"/>
+    <ds:schemaRef ds:uri="http://schemas.microsoft.com/office/infopath/2007/PartnerControls"/>
+    <ds:schemaRef ds:uri="71af3243-3dd4-4a8d-8c0d-dd76da1f02a5"/>
+  </ds:schemaRefs>
+</ds:datastoreItem>
 </file>
 
-<file path=customXml/item3.xml><?xml version="1.0" encoding="utf-8"?>
-<p:properties xmlns:p="http://schemas.microsoft.com/office/2006/metadata/properties" xmlns:xsi="http://www.w3.org/2001/XMLSchema-instance" xmlns:pc="http://schemas.microsoft.com/office/infopath/2007/PartnerControls">
-  <documentManagement>
-    <Status xmlns="71af3243-3dd4-4a8d-8c0d-dd76da1f02a5">Not started</Status>
-    <MediaServiceKeyPoints xmlns="71af3243-3dd4-4a8d-8c0d-dd76da1f02a5" xsi:nil="true"/>
-  </documentManagement>
-</p:properties>
+<file path=customXml/itemProps2.xml><?xml version="1.0" encoding="utf-8"?>
+<ds:datastoreItem xmlns:ds="http://schemas.openxmlformats.org/officeDocument/2006/customXml" ds:itemID="{CDB58277-F8DF-46FF-84EC-EF41B835E69F}">
+  <ds:schemaRefs>
+    <ds:schemaRef ds:uri="http://schemas.microsoft.com/sharepoint/v3/contenttype/forms"/>
+  </ds:schemaRefs>
+</ds:datastoreItem>
 </file>
 
-<file path=customXml/itemProps1.xml><?xml version="1.0" encoding="utf-8"?>
+<file path=customXml/itemProps3.xml><?xml version="1.0" encoding="utf-8"?>
 <ds:datastoreItem xmlns:ds="http://schemas.openxmlformats.org/officeDocument/2006/customXml" ds:itemID="{2D276E62-80A3-44DD-9BCC-97ED2B99B57F}">
   <ds:schemaRefs>
     <ds:schemaRef ds:uri="http://schemas.microsoft.com/office/2006/metadata/contentType"/>
@@ -9006,22 +9113,4 @@
     <ds:schemaRef ds:uri="http://schemas.microsoft.com/internal/obd"/>
   </ds:schemaRefs>
 </ds:datastoreItem>
-</file>
-
-<file path=customXml/itemProps2.xml><?xml version="1.0" encoding="utf-8"?>
-<ds:datastoreItem xmlns:ds="http://schemas.openxmlformats.org/officeDocument/2006/customXml" ds:itemID="{CDB58277-F8DF-46FF-84EC-EF41B835E69F}">
-  <ds:schemaRefs>
-    <ds:schemaRef ds:uri="http://schemas.microsoft.com/sharepoint/v3/contenttype/forms"/>
-  </ds:schemaRefs>
-</ds:datastoreItem>
-</file>
-
-<file path=customXml/itemProps3.xml><?xml version="1.0" encoding="utf-8"?>
-<ds:datastoreItem xmlns:ds="http://schemas.openxmlformats.org/officeDocument/2006/customXml" ds:itemID="{137651BA-F45C-4845-9AB3-E0A65B39F5E1}">
-  <ds:schemaRefs>
-    <ds:schemaRef ds:uri="http://schemas.microsoft.com/office/2006/metadata/properties"/>
-    <ds:schemaRef ds:uri="http://schemas.microsoft.com/office/infopath/2007/PartnerControls"/>
-    <ds:schemaRef ds:uri="71af3243-3dd4-4a8d-8c0d-dd76da1f02a5"/>
-  </ds:schemaRefs>
-</ds:datastoreItem>
 </file>
</xml_diff>